<commit_message>
BAS-02 complete. BAS-03 WIP.
</commit_message>
<xml_diff>
--- a/TRP/BAS/BAS-01/494-BAS-01 - Trainee Presentation.pptx
+++ b/TRP/BAS/BAS-01/494-BAS-01 - Trainee Presentation.pptx
@@ -222,18 +222,18 @@
   <pc:docChgLst>
     <pc:chgData name="Adam Arkley" userId="d399d8a812f0f754" providerId="LiveId" clId="{CFE058CD-12C4-4C77-9E09-F9656C083B15}"/>
     <pc:docChg chg="undo redo custSel addSld delSld modSld sldOrd addSection modSection">
-      <pc:chgData name="Adam Arkley" userId="d399d8a812f0f754" providerId="LiveId" clId="{CFE058CD-12C4-4C77-9E09-F9656C083B15}" dt="2020-09-22T20:40:09.619" v="3179" actId="20577"/>
+      <pc:chgData name="Adam Arkley" userId="d399d8a812f0f754" providerId="LiveId" clId="{CFE058CD-12C4-4C77-9E09-F9656C083B15}" dt="2020-09-23T09:18:53.341" v="3195" actId="20577"/>
       <pc:docMkLst>
         <pc:docMk/>
       </pc:docMkLst>
       <pc:sldChg chg="modSp mod">
-        <pc:chgData name="Adam Arkley" userId="d399d8a812f0f754" providerId="LiveId" clId="{CFE058CD-12C4-4C77-9E09-F9656C083B15}" dt="2020-09-22T20:40:09.619" v="3179" actId="20577"/>
+        <pc:chgData name="Adam Arkley" userId="d399d8a812f0f754" providerId="LiveId" clId="{CFE058CD-12C4-4C77-9E09-F9656C083B15}" dt="2020-09-23T09:18:53.341" v="3195" actId="20577"/>
         <pc:sldMkLst>
           <pc:docMk/>
           <pc:sldMk cId="2701037055" sldId="256"/>
         </pc:sldMkLst>
         <pc:spChg chg="mod">
-          <ac:chgData name="Adam Arkley" userId="d399d8a812f0f754" providerId="LiveId" clId="{CFE058CD-12C4-4C77-9E09-F9656C083B15}" dt="2020-09-22T20:39:56.777" v="3168" actId="20577"/>
+          <ac:chgData name="Adam Arkley" userId="d399d8a812f0f754" providerId="LiveId" clId="{CFE058CD-12C4-4C77-9E09-F9656C083B15}" dt="2020-09-23T09:18:50.878" v="3193" actId="20577"/>
           <ac:spMkLst>
             <pc:docMk/>
             <pc:sldMk cId="2701037055" sldId="256"/>
@@ -241,7 +241,7 @@
           </ac:spMkLst>
         </pc:spChg>
         <pc:spChg chg="mod">
-          <ac:chgData name="Adam Arkley" userId="d399d8a812f0f754" providerId="LiveId" clId="{CFE058CD-12C4-4C77-9E09-F9656C083B15}" dt="2020-09-22T20:40:09.619" v="3179" actId="20577"/>
+          <ac:chgData name="Adam Arkley" userId="d399d8a812f0f754" providerId="LiveId" clId="{CFE058CD-12C4-4C77-9E09-F9656C083B15}" dt="2020-09-23T09:18:53.341" v="3195" actId="20577"/>
           <ac:spMkLst>
             <pc:docMk/>
             <pc:sldMk cId="2701037055" sldId="256"/>
@@ -424,7 +424,7 @@
         </pc:spChg>
       </pc:sldChg>
       <pc:sldChg chg="modSp add mod ord">
-        <pc:chgData name="Adam Arkley" userId="d399d8a812f0f754" providerId="LiveId" clId="{CFE058CD-12C4-4C77-9E09-F9656C083B15}" dt="2020-09-22T20:33:32.484" v="2301" actId="255"/>
+        <pc:chgData name="Adam Arkley" userId="d399d8a812f0f754" providerId="LiveId" clId="{CFE058CD-12C4-4C77-9E09-F9656C083B15}" dt="2020-09-23T09:18:34.088" v="3191" actId="20577"/>
         <pc:sldMkLst>
           <pc:docMk/>
           <pc:sldMk cId="3411951501" sldId="273"/>
@@ -438,7 +438,7 @@
           </ac:spMkLst>
         </pc:spChg>
         <pc:spChg chg="mod">
-          <ac:chgData name="Adam Arkley" userId="d399d8a812f0f754" providerId="LiveId" clId="{CFE058CD-12C4-4C77-9E09-F9656C083B15}" dt="2020-09-22T20:33:32.484" v="2301" actId="255"/>
+          <ac:chgData name="Adam Arkley" userId="d399d8a812f0f754" providerId="LiveId" clId="{CFE058CD-12C4-4C77-9E09-F9656C083B15}" dt="2020-09-23T09:18:34.088" v="3191" actId="20577"/>
           <ac:spMkLst>
             <pc:docMk/>
             <pc:sldMk cId="3411951501" sldId="273"/>
@@ -1846,7 +1846,7 @@
             <a:fld id="{C89BED82-0386-424B-8522-487198B6AAA6}" type="datetimeFigureOut">
               <a:rPr lang="nb-NO" smtClean="0"/>
               <a:pPr/>
-              <a:t>22.09.2020</a:t>
+              <a:t>23.09.2020</a:t>
             </a:fld>
             <a:endParaRPr lang="nb-NO"/>
           </a:p>
@@ -2398,7 +2398,7 @@
           <a:p>
             <a:fld id="{3434F07C-7B4A-4A07-9283-14DC65FBC703}" type="datetimeFigureOut">
               <a:rPr lang="en-GB" smtClean="0"/>
-              <a:t>22/09/2020</a:t>
+              <a:t>23/09/2020</a:t>
             </a:fld>
             <a:endParaRPr lang="en-GB"/>
           </a:p>
@@ -2638,7 +2638,7 @@
           <a:p>
             <a:fld id="{3434F07C-7B4A-4A07-9283-14DC65FBC703}" type="datetimeFigureOut">
               <a:rPr lang="en-GB" smtClean="0"/>
-              <a:t>22/09/2020</a:t>
+              <a:t>23/09/2020</a:t>
             </a:fld>
             <a:endParaRPr lang="en-GB"/>
           </a:p>
@@ -2915,7 +2915,7 @@
             <a:fld id="{BB56636F-9E64-48A9-A0E8-D6911EA208CE}" type="datetimeFigureOut">
               <a:rPr lang="nb-NO" smtClean="0"/>
               <a:pPr/>
-              <a:t>22.09.2020</a:t>
+              <a:t>23.09.2020</a:t>
             </a:fld>
             <a:endParaRPr lang="nb-NO"/>
           </a:p>
@@ -3476,7 +3476,7 @@
           <a:p>
             <a:fld id="{3434F07C-7B4A-4A07-9283-14DC65FBC703}" type="datetimeFigureOut">
               <a:rPr lang="en-GB" smtClean="0"/>
-              <a:t>22/09/2020</a:t>
+              <a:t>23/09/2020</a:t>
             </a:fld>
             <a:endParaRPr lang="en-GB"/>
           </a:p>
@@ -3782,7 +3782,7 @@
           <a:p>
             <a:fld id="{3434F07C-7B4A-4A07-9283-14DC65FBC703}" type="datetimeFigureOut">
               <a:rPr lang="en-GB" smtClean="0"/>
-              <a:t>22/09/2020</a:t>
+              <a:t>23/09/2020</a:t>
             </a:fld>
             <a:endParaRPr lang="en-GB"/>
           </a:p>
@@ -4236,7 +4236,7 @@
           <a:p>
             <a:fld id="{3434F07C-7B4A-4A07-9283-14DC65FBC703}" type="datetimeFigureOut">
               <a:rPr lang="en-GB" smtClean="0"/>
-              <a:t>22/09/2020</a:t>
+              <a:t>23/09/2020</a:t>
             </a:fld>
             <a:endParaRPr lang="en-GB"/>
           </a:p>
@@ -4410,7 +4410,7 @@
           <a:p>
             <a:fld id="{3434F07C-7B4A-4A07-9283-14DC65FBC703}" type="datetimeFigureOut">
               <a:rPr lang="en-GB" smtClean="0"/>
-              <a:t>22/09/2020</a:t>
+              <a:t>23/09/2020</a:t>
             </a:fld>
             <a:endParaRPr lang="en-GB"/>
           </a:p>
@@ -4547,7 +4547,7 @@
           <a:p>
             <a:fld id="{3434F07C-7B4A-4A07-9283-14DC65FBC703}" type="datetimeFigureOut">
               <a:rPr lang="en-GB" smtClean="0"/>
-              <a:t>22/09/2020</a:t>
+              <a:t>23/09/2020</a:t>
             </a:fld>
             <a:endParaRPr lang="en-GB"/>
           </a:p>
@@ -4787,7 +4787,7 @@
           <a:p>
             <a:fld id="{3434F07C-7B4A-4A07-9283-14DC65FBC703}" type="datetimeFigureOut">
               <a:rPr lang="en-GB" smtClean="0"/>
-              <a:t>22/09/2020</a:t>
+              <a:t>23/09/2020</a:t>
             </a:fld>
             <a:endParaRPr lang="en-GB"/>
           </a:p>
@@ -5133,7 +5133,7 @@
           <a:p>
             <a:fld id="{3434F07C-7B4A-4A07-9283-14DC65FBC703}" type="datetimeFigureOut">
               <a:rPr lang="en-GB" smtClean="0"/>
-              <a:t>22/09/2020</a:t>
+              <a:t>23/09/2020</a:t>
             </a:fld>
             <a:endParaRPr lang="en-GB"/>
           </a:p>
@@ -5455,7 +5455,7 @@
           <a:p>
             <a:fld id="{3434F07C-7B4A-4A07-9283-14DC65FBC703}" type="datetimeFigureOut">
               <a:rPr lang="en-GB" smtClean="0"/>
-              <a:t>22/09/2020</a:t>
+              <a:t>23/09/2020</a:t>
             </a:fld>
             <a:endParaRPr lang="en-GB"/>
           </a:p>
@@ -5695,7 +5695,7 @@
           <a:p>
             <a:fld id="{3434F07C-7B4A-4A07-9283-14DC65FBC703}" type="datetimeFigureOut">
               <a:rPr lang="en-GB" smtClean="0"/>
-              <a:t>22/09/2020</a:t>
+              <a:t>23/09/2020</a:t>
             </a:fld>
             <a:endParaRPr lang="en-GB"/>
           </a:p>
@@ -5935,7 +5935,7 @@
           <a:p>
             <a:fld id="{3434F07C-7B4A-4A07-9283-14DC65FBC703}" type="datetimeFigureOut">
               <a:rPr lang="en-GB" smtClean="0"/>
-              <a:t>22/09/2020</a:t>
+              <a:t>23/09/2020</a:t>
             </a:fld>
             <a:endParaRPr lang="en-GB"/>
           </a:p>
@@ -6212,7 +6212,7 @@
             <a:fld id="{BB56636F-9E64-48A9-A0E8-D6911EA208CE}" type="datetimeFigureOut">
               <a:rPr lang="nb-NO" smtClean="0"/>
               <a:pPr/>
-              <a:t>22.09.2020</a:t>
+              <a:t>23.09.2020</a:t>
             </a:fld>
             <a:endParaRPr lang="nb-NO"/>
           </a:p>
@@ -6507,7 +6507,7 @@
           <a:p>
             <a:fld id="{3434F07C-7B4A-4A07-9283-14DC65FBC703}" type="datetimeFigureOut">
               <a:rPr lang="en-GB" smtClean="0"/>
-              <a:t>22/09/2020</a:t>
+              <a:t>23/09/2020</a:t>
             </a:fld>
             <a:endParaRPr lang="en-GB"/>
           </a:p>
@@ -6813,7 +6813,7 @@
           <a:p>
             <a:fld id="{3434F07C-7B4A-4A07-9283-14DC65FBC703}" type="datetimeFigureOut">
               <a:rPr lang="en-GB" smtClean="0"/>
-              <a:t>22/09/2020</a:t>
+              <a:t>23/09/2020</a:t>
             </a:fld>
             <a:endParaRPr lang="en-GB"/>
           </a:p>
@@ -7267,7 +7267,7 @@
           <a:p>
             <a:fld id="{3434F07C-7B4A-4A07-9283-14DC65FBC703}" type="datetimeFigureOut">
               <a:rPr lang="en-GB" smtClean="0"/>
-              <a:t>22/09/2020</a:t>
+              <a:t>23/09/2020</a:t>
             </a:fld>
             <a:endParaRPr lang="en-GB"/>
           </a:p>
@@ -7441,7 +7441,7 @@
           <a:p>
             <a:fld id="{3434F07C-7B4A-4A07-9283-14DC65FBC703}" type="datetimeFigureOut">
               <a:rPr lang="en-GB" smtClean="0"/>
-              <a:t>22/09/2020</a:t>
+              <a:t>23/09/2020</a:t>
             </a:fld>
             <a:endParaRPr lang="en-GB"/>
           </a:p>
@@ -7578,7 +7578,7 @@
           <a:p>
             <a:fld id="{3434F07C-7B4A-4A07-9283-14DC65FBC703}" type="datetimeFigureOut">
               <a:rPr lang="en-GB" smtClean="0"/>
-              <a:t>22/09/2020</a:t>
+              <a:t>23/09/2020</a:t>
             </a:fld>
             <a:endParaRPr lang="en-GB"/>
           </a:p>
@@ -7924,7 +7924,7 @@
           <a:p>
             <a:fld id="{3434F07C-7B4A-4A07-9283-14DC65FBC703}" type="datetimeFigureOut">
               <a:rPr lang="en-GB" smtClean="0"/>
-              <a:t>22/09/2020</a:t>
+              <a:t>23/09/2020</a:t>
             </a:fld>
             <a:endParaRPr lang="en-GB"/>
           </a:p>
@@ -8246,7 +8246,7 @@
           <a:p>
             <a:fld id="{3434F07C-7B4A-4A07-9283-14DC65FBC703}" type="datetimeFigureOut">
               <a:rPr lang="en-GB" smtClean="0"/>
-              <a:t>22/09/2020</a:t>
+              <a:t>23/09/2020</a:t>
             </a:fld>
             <a:endParaRPr lang="en-GB"/>
           </a:p>
@@ -9797,7 +9797,7 @@
           <a:p>
             <a:r>
               <a:rPr lang="en-GB" sz="1200" dirty="0"/>
-              <a:t>22 Sep 2020</a:t>
+              <a:t>23 Sep 2020</a:t>
             </a:r>
           </a:p>
         </p:txBody>
@@ -9832,7 +9832,7 @@
           <a:p>
             <a:r>
               <a:rPr lang="en-GB" sz="1200" dirty="0"/>
-              <a:t>22 Mar 2021</a:t>
+              <a:t>23 Mar 2021</a:t>
             </a:r>
           </a:p>
         </p:txBody>
@@ -10671,7 +10671,7 @@
           <a:p>
             <a:r>
               <a:rPr lang="en-GB" sz="2500" dirty="0"/>
-              <a:t>Given the permutations in equipment, tuition is not provided, although help may be sought from the #technical_support channel in the 132</a:t>
+              <a:t>Given the variations in equipment, tuition is not provided, although help may be sought from the #technical_support channel in the 132</a:t>
             </a:r>
             <a:r>
               <a:rPr lang="en-GB" sz="2500" baseline="30000" dirty="0"/>

</xml_diff>

<commit_message>
Included Kneeboard Import in BAS-01
</commit_message>
<xml_diff>
--- a/TRP/BAS/BAS-01/494-BAS-01 - Trainee Presentation.pptx
+++ b/TRP/BAS/BAS-01/494-BAS-01 - Trainee Presentation.pptx
@@ -26,8 +26,8 @@
     <p:sldId id="272" r:id="rId17"/>
     <p:sldId id="273" r:id="rId18"/>
     <p:sldId id="274" r:id="rId19"/>
-    <p:sldId id="275" r:id="rId20"/>
-    <p:sldId id="258" r:id="rId21"/>
+    <p:sldId id="276" r:id="rId20"/>
+    <p:sldId id="275" r:id="rId21"/>
   </p:sldIdLst>
   <p:sldSz cx="9144000" cy="6858000" type="screen4x3"/>
   <p:notesSz cx="6858000" cy="9144000"/>
@@ -164,15 +164,19 @@
             <p14:sldId id="273"/>
           </p14:sldIdLst>
         </p14:section>
-        <p14:section name="DCS Controls" id="{721C9128-65EA-4746-A40C-B4A05240B322}">
+        <p14:section name="Kneeboards" id="{9ED7C575-3E58-4407-BEBF-012C0BBA7700}">
           <p14:sldIdLst>
             <p14:sldId id="274"/>
+          </p14:sldIdLst>
+        </p14:section>
+        <p14:section name="DCS Controls" id="{B3952505-89AA-457F-B544-1FAAE68B793D}">
+          <p14:sldIdLst>
+            <p14:sldId id="276"/>
           </p14:sldIdLst>
         </p14:section>
         <p14:section name="Testing" id="{EF24B819-E14C-463E-A7D7-7A5F71138053}">
           <p14:sldIdLst>
             <p14:sldId id="275"/>
-            <p14:sldId id="258"/>
           </p14:sldIdLst>
         </p14:section>
       </p14:sectionLst>
@@ -212,7 +216,7 @@
 <file path=ppt/revisionInfo.xml><?xml version="1.0" encoding="utf-8"?>
 <p1510:revInfo xmlns:a="http://schemas.openxmlformats.org/drawingml/2006/main" xmlns:r="http://schemas.openxmlformats.org/officeDocument/2006/relationships" xmlns:p1510="http://schemas.microsoft.com/office/powerpoint/2015/10/main">
   <p1510:revLst>
-    <p1510:client id="{CFE058CD-12C4-4C77-9E09-F9656C083B15}" v="10" dt="2020-09-22T20:37:19.169"/>
+    <p1510:client id="{CFE058CD-12C4-4C77-9E09-F9656C083B15}" v="11" dt="2020-09-26T15:20:12.909"/>
   </p1510:revLst>
 </p1510:revInfo>
 </file>
@@ -221,8 +225,8 @@
 <pc:chgInfo xmlns:a="http://schemas.openxmlformats.org/drawingml/2006/main" xmlns:r="http://schemas.openxmlformats.org/officeDocument/2006/relationships" xmlns:ac="http://schemas.microsoft.com/office/drawing/2013/main/command" xmlns:pc="http://schemas.microsoft.com/office/powerpoint/2013/main/command">
   <pc:docChgLst>
     <pc:chgData name="Adam Arkley" userId="d399d8a812f0f754" providerId="LiveId" clId="{CFE058CD-12C4-4C77-9E09-F9656C083B15}"/>
-    <pc:docChg chg="undo redo custSel addSld delSld modSld sldOrd addSection modSection">
-      <pc:chgData name="Adam Arkley" userId="d399d8a812f0f754" providerId="LiveId" clId="{CFE058CD-12C4-4C77-9E09-F9656C083B15}" dt="2020-09-23T09:18:53.341" v="3195" actId="20577"/>
+    <pc:docChg chg="undo redo custSel addSld delSld modSld sldOrd addSection delSection modSection">
+      <pc:chgData name="Adam Arkley" userId="d399d8a812f0f754" providerId="LiveId" clId="{CFE058CD-12C4-4C77-9E09-F9656C083B15}" dt="2020-09-26T15:22:31.181" v="3621" actId="20577"/>
       <pc:docMkLst>
         <pc:docMk/>
       </pc:docMkLst>
@@ -250,13 +254,13 @@
         </pc:spChg>
       </pc:sldChg>
       <pc:sldChg chg="modSp mod">
-        <pc:chgData name="Adam Arkley" userId="d399d8a812f0f754" providerId="LiveId" clId="{CFE058CD-12C4-4C77-9E09-F9656C083B15}" dt="2020-09-22T20:32:26.876" v="1982" actId="6549"/>
+        <pc:chgData name="Adam Arkley" userId="d399d8a812f0f754" providerId="LiveId" clId="{CFE058CD-12C4-4C77-9E09-F9656C083B15}" dt="2020-09-26T15:20:40.652" v="3245" actId="6549"/>
         <pc:sldMkLst>
           <pc:docMk/>
           <pc:sldMk cId="591849276" sldId="257"/>
         </pc:sldMkLst>
         <pc:spChg chg="mod">
-          <ac:chgData name="Adam Arkley" userId="d399d8a812f0f754" providerId="LiveId" clId="{CFE058CD-12C4-4C77-9E09-F9656C083B15}" dt="2020-09-22T20:32:26.876" v="1982" actId="6549"/>
+          <ac:chgData name="Adam Arkley" userId="d399d8a812f0f754" providerId="LiveId" clId="{CFE058CD-12C4-4C77-9E09-F9656C083B15}" dt="2020-09-26T15:20:40.652" v="3245" actId="6549"/>
           <ac:spMkLst>
             <pc:docMk/>
             <pc:sldMk cId="591849276" sldId="257"/>
@@ -264,8 +268,8 @@
           </ac:spMkLst>
         </pc:spChg>
       </pc:sldChg>
-      <pc:sldChg chg="modSp mod">
-        <pc:chgData name="Adam Arkley" userId="d399d8a812f0f754" providerId="LiveId" clId="{CFE058CD-12C4-4C77-9E09-F9656C083B15}" dt="2020-09-22T20:31:26.849" v="1954" actId="6549"/>
+      <pc:sldChg chg="modSp del mod">
+        <pc:chgData name="Adam Arkley" userId="d399d8a812f0f754" providerId="LiveId" clId="{CFE058CD-12C4-4C77-9E09-F9656C083B15}" dt="2020-09-26T15:16:52.083" v="3196" actId="2696"/>
         <pc:sldMkLst>
           <pc:docMk/>
           <pc:sldMk cId="266764874" sldId="258"/>
@@ -446,14 +450,14 @@
           </ac:spMkLst>
         </pc:spChg>
       </pc:sldChg>
-      <pc:sldChg chg="modSp add mod">
-        <pc:chgData name="Adam Arkley" userId="d399d8a812f0f754" providerId="LiveId" clId="{CFE058CD-12C4-4C77-9E09-F9656C083B15}" dt="2020-09-22T20:37:21.041" v="3155" actId="20577"/>
+      <pc:sldChg chg="modSp add mod ord">
+        <pc:chgData name="Adam Arkley" userId="d399d8a812f0f754" providerId="LiveId" clId="{CFE058CD-12C4-4C77-9E09-F9656C083B15}" dt="2020-09-26T15:22:31.181" v="3621" actId="20577"/>
         <pc:sldMkLst>
           <pc:docMk/>
           <pc:sldMk cId="1457849939" sldId="274"/>
         </pc:sldMkLst>
         <pc:spChg chg="mod">
-          <ac:chgData name="Adam Arkley" userId="d399d8a812f0f754" providerId="LiveId" clId="{CFE058CD-12C4-4C77-9E09-F9656C083B15}" dt="2020-09-22T20:33:50.048" v="2337" actId="20577"/>
+          <ac:chgData name="Adam Arkley" userId="d399d8a812f0f754" providerId="LiveId" clId="{CFE058CD-12C4-4C77-9E09-F9656C083B15}" dt="2020-09-26T15:20:27.219" v="3222" actId="20577"/>
           <ac:spMkLst>
             <pc:docMk/>
             <pc:sldMk cId="1457849939" sldId="274"/>
@@ -461,7 +465,7 @@
           </ac:spMkLst>
         </pc:spChg>
         <pc:spChg chg="mod">
-          <ac:chgData name="Adam Arkley" userId="d399d8a812f0f754" providerId="LiveId" clId="{CFE058CD-12C4-4C77-9E09-F9656C083B15}" dt="2020-09-22T20:37:21.041" v="3155" actId="20577"/>
+          <ac:chgData name="Adam Arkley" userId="d399d8a812f0f754" providerId="LiveId" clId="{CFE058CD-12C4-4C77-9E09-F9656C083B15}" dt="2020-09-26T15:22:31.181" v="3621" actId="20577"/>
           <ac:spMkLst>
             <pc:docMk/>
             <pc:sldMk cId="1457849939" sldId="274"/>
@@ -491,6 +495,13 @@
             <ac:spMk id="3" creationId="{552AC59D-0089-491B-972F-1BE19B339C77}"/>
           </ac:spMkLst>
         </pc:spChg>
+      </pc:sldChg>
+      <pc:sldChg chg="add">
+        <pc:chgData name="Adam Arkley" userId="d399d8a812f0f754" providerId="LiveId" clId="{CFE058CD-12C4-4C77-9E09-F9656C083B15}" dt="2020-09-26T15:20:12.907" v="3197"/>
+        <pc:sldMkLst>
+          <pc:docMk/>
+          <pc:sldMk cId="3729102954" sldId="276"/>
+        </pc:sldMkLst>
       </pc:sldChg>
     </pc:docChg>
   </pc:docChgLst>
@@ -1846,7 +1857,7 @@
             <a:fld id="{C89BED82-0386-424B-8522-487198B6AAA6}" type="datetimeFigureOut">
               <a:rPr lang="nb-NO" smtClean="0"/>
               <a:pPr/>
-              <a:t>23.09.2020</a:t>
+              <a:t>26.09.2020</a:t>
             </a:fld>
             <a:endParaRPr lang="nb-NO"/>
           </a:p>
@@ -2398,7 +2409,7 @@
           <a:p>
             <a:fld id="{3434F07C-7B4A-4A07-9283-14DC65FBC703}" type="datetimeFigureOut">
               <a:rPr lang="en-GB" smtClean="0"/>
-              <a:t>23/09/2020</a:t>
+              <a:t>26/09/2020</a:t>
             </a:fld>
             <a:endParaRPr lang="en-GB"/>
           </a:p>
@@ -2638,7 +2649,7 @@
           <a:p>
             <a:fld id="{3434F07C-7B4A-4A07-9283-14DC65FBC703}" type="datetimeFigureOut">
               <a:rPr lang="en-GB" smtClean="0"/>
-              <a:t>23/09/2020</a:t>
+              <a:t>26/09/2020</a:t>
             </a:fld>
             <a:endParaRPr lang="en-GB"/>
           </a:p>
@@ -2915,7 +2926,7 @@
             <a:fld id="{BB56636F-9E64-48A9-A0E8-D6911EA208CE}" type="datetimeFigureOut">
               <a:rPr lang="nb-NO" smtClean="0"/>
               <a:pPr/>
-              <a:t>23.09.2020</a:t>
+              <a:t>26.09.2020</a:t>
             </a:fld>
             <a:endParaRPr lang="nb-NO"/>
           </a:p>
@@ -3476,7 +3487,7 @@
           <a:p>
             <a:fld id="{3434F07C-7B4A-4A07-9283-14DC65FBC703}" type="datetimeFigureOut">
               <a:rPr lang="en-GB" smtClean="0"/>
-              <a:t>23/09/2020</a:t>
+              <a:t>26/09/2020</a:t>
             </a:fld>
             <a:endParaRPr lang="en-GB"/>
           </a:p>
@@ -3782,7 +3793,7 @@
           <a:p>
             <a:fld id="{3434F07C-7B4A-4A07-9283-14DC65FBC703}" type="datetimeFigureOut">
               <a:rPr lang="en-GB" smtClean="0"/>
-              <a:t>23/09/2020</a:t>
+              <a:t>26/09/2020</a:t>
             </a:fld>
             <a:endParaRPr lang="en-GB"/>
           </a:p>
@@ -4236,7 +4247,7 @@
           <a:p>
             <a:fld id="{3434F07C-7B4A-4A07-9283-14DC65FBC703}" type="datetimeFigureOut">
               <a:rPr lang="en-GB" smtClean="0"/>
-              <a:t>23/09/2020</a:t>
+              <a:t>26/09/2020</a:t>
             </a:fld>
             <a:endParaRPr lang="en-GB"/>
           </a:p>
@@ -4410,7 +4421,7 @@
           <a:p>
             <a:fld id="{3434F07C-7B4A-4A07-9283-14DC65FBC703}" type="datetimeFigureOut">
               <a:rPr lang="en-GB" smtClean="0"/>
-              <a:t>23/09/2020</a:t>
+              <a:t>26/09/2020</a:t>
             </a:fld>
             <a:endParaRPr lang="en-GB"/>
           </a:p>
@@ -4547,7 +4558,7 @@
           <a:p>
             <a:fld id="{3434F07C-7B4A-4A07-9283-14DC65FBC703}" type="datetimeFigureOut">
               <a:rPr lang="en-GB" smtClean="0"/>
-              <a:t>23/09/2020</a:t>
+              <a:t>26/09/2020</a:t>
             </a:fld>
             <a:endParaRPr lang="en-GB"/>
           </a:p>
@@ -4787,7 +4798,7 @@
           <a:p>
             <a:fld id="{3434F07C-7B4A-4A07-9283-14DC65FBC703}" type="datetimeFigureOut">
               <a:rPr lang="en-GB" smtClean="0"/>
-              <a:t>23/09/2020</a:t>
+              <a:t>26/09/2020</a:t>
             </a:fld>
             <a:endParaRPr lang="en-GB"/>
           </a:p>
@@ -5133,7 +5144,7 @@
           <a:p>
             <a:fld id="{3434F07C-7B4A-4A07-9283-14DC65FBC703}" type="datetimeFigureOut">
               <a:rPr lang="en-GB" smtClean="0"/>
-              <a:t>23/09/2020</a:t>
+              <a:t>26/09/2020</a:t>
             </a:fld>
             <a:endParaRPr lang="en-GB"/>
           </a:p>
@@ -5455,7 +5466,7 @@
           <a:p>
             <a:fld id="{3434F07C-7B4A-4A07-9283-14DC65FBC703}" type="datetimeFigureOut">
               <a:rPr lang="en-GB" smtClean="0"/>
-              <a:t>23/09/2020</a:t>
+              <a:t>26/09/2020</a:t>
             </a:fld>
             <a:endParaRPr lang="en-GB"/>
           </a:p>
@@ -5695,7 +5706,7 @@
           <a:p>
             <a:fld id="{3434F07C-7B4A-4A07-9283-14DC65FBC703}" type="datetimeFigureOut">
               <a:rPr lang="en-GB" smtClean="0"/>
-              <a:t>23/09/2020</a:t>
+              <a:t>26/09/2020</a:t>
             </a:fld>
             <a:endParaRPr lang="en-GB"/>
           </a:p>
@@ -5935,7 +5946,7 @@
           <a:p>
             <a:fld id="{3434F07C-7B4A-4A07-9283-14DC65FBC703}" type="datetimeFigureOut">
               <a:rPr lang="en-GB" smtClean="0"/>
-              <a:t>23/09/2020</a:t>
+              <a:t>26/09/2020</a:t>
             </a:fld>
             <a:endParaRPr lang="en-GB"/>
           </a:p>
@@ -6212,7 +6223,7 @@
             <a:fld id="{BB56636F-9E64-48A9-A0E8-D6911EA208CE}" type="datetimeFigureOut">
               <a:rPr lang="nb-NO" smtClean="0"/>
               <a:pPr/>
-              <a:t>23.09.2020</a:t>
+              <a:t>26.09.2020</a:t>
             </a:fld>
             <a:endParaRPr lang="nb-NO"/>
           </a:p>
@@ -6507,7 +6518,7 @@
           <a:p>
             <a:fld id="{3434F07C-7B4A-4A07-9283-14DC65FBC703}" type="datetimeFigureOut">
               <a:rPr lang="en-GB" smtClean="0"/>
-              <a:t>23/09/2020</a:t>
+              <a:t>26/09/2020</a:t>
             </a:fld>
             <a:endParaRPr lang="en-GB"/>
           </a:p>
@@ -6813,7 +6824,7 @@
           <a:p>
             <a:fld id="{3434F07C-7B4A-4A07-9283-14DC65FBC703}" type="datetimeFigureOut">
               <a:rPr lang="en-GB" smtClean="0"/>
-              <a:t>23/09/2020</a:t>
+              <a:t>26/09/2020</a:t>
             </a:fld>
             <a:endParaRPr lang="en-GB"/>
           </a:p>
@@ -7267,7 +7278,7 @@
           <a:p>
             <a:fld id="{3434F07C-7B4A-4A07-9283-14DC65FBC703}" type="datetimeFigureOut">
               <a:rPr lang="en-GB" smtClean="0"/>
-              <a:t>23/09/2020</a:t>
+              <a:t>26/09/2020</a:t>
             </a:fld>
             <a:endParaRPr lang="en-GB"/>
           </a:p>
@@ -7441,7 +7452,7 @@
           <a:p>
             <a:fld id="{3434F07C-7B4A-4A07-9283-14DC65FBC703}" type="datetimeFigureOut">
               <a:rPr lang="en-GB" smtClean="0"/>
-              <a:t>23/09/2020</a:t>
+              <a:t>26/09/2020</a:t>
             </a:fld>
             <a:endParaRPr lang="en-GB"/>
           </a:p>
@@ -7578,7 +7589,7 @@
           <a:p>
             <a:fld id="{3434F07C-7B4A-4A07-9283-14DC65FBC703}" type="datetimeFigureOut">
               <a:rPr lang="en-GB" smtClean="0"/>
-              <a:t>23/09/2020</a:t>
+              <a:t>26/09/2020</a:t>
             </a:fld>
             <a:endParaRPr lang="en-GB"/>
           </a:p>
@@ -7924,7 +7935,7 @@
           <a:p>
             <a:fld id="{3434F07C-7B4A-4A07-9283-14DC65FBC703}" type="datetimeFigureOut">
               <a:rPr lang="en-GB" smtClean="0"/>
-              <a:t>23/09/2020</a:t>
+              <a:t>26/09/2020</a:t>
             </a:fld>
             <a:endParaRPr lang="en-GB"/>
           </a:p>
@@ -8246,7 +8257,7 @@
           <a:p>
             <a:fld id="{3434F07C-7B4A-4A07-9283-14DC65FBC703}" type="datetimeFigureOut">
               <a:rPr lang="en-GB" smtClean="0"/>
-              <a:t>23/09/2020</a:t>
+              <a:t>26/09/2020</a:t>
             </a:fld>
             <a:endParaRPr lang="en-GB"/>
           </a:p>
@@ -10777,7 +10788,7 @@
           <a:p>
             <a:r>
               <a:rPr lang="en-GB" sz="3800" dirty="0"/>
-              <a:t>Configuring DCS Controls</a:t>
+              <a:t>Importing Kneeboards</a:t>
             </a:r>
           </a:p>
         </p:txBody>
@@ -10805,31 +10816,27 @@
           <a:p>
             <a:r>
               <a:rPr lang="en-GB" sz="2500" dirty="0"/>
-              <a:t>In preparation to fly, trainee pilots should map controls for their joystick/HOTAS.</a:t>
-            </a:r>
-          </a:p>
-          <a:p>
+              <a:t>Customised images can be imported for display in the in-game Kneeboard (</a:t>
+            </a:r>
+            <a:r>
+              <a:rPr lang="en-GB" sz="2500" dirty="0" err="1"/>
+              <a:t>Rshift</a:t>
+            </a:r>
             <a:r>
               <a:rPr lang="en-GB" sz="2500" dirty="0"/>
-              <a:t>The 494</a:t>
-            </a:r>
-            <a:r>
-              <a:rPr lang="en-GB" sz="2500" baseline="30000" dirty="0"/>
-              <a:t>th</a:t>
-            </a:r>
+              <a:t> + K).</a:t>
+            </a:r>
+          </a:p>
+          <a:p>
             <a:r>
               <a:rPr lang="en-GB" sz="2500" dirty="0"/>
-              <a:t> VFS recommends the use of Chuck’s Guides for support in mapping. The F/A-18C guide is available </a:t>
-            </a:r>
-            <a:r>
-              <a:rPr lang="en-GB" sz="2500" dirty="0">
-                <a:hlinkClick r:id="rId2"/>
-              </a:rPr>
-              <a:t>here</a:t>
-            </a:r>
+              <a:t>Place PNG files in the FA-18C_hornet kneeboard folder, found at C:\Users\Ashilta\Saved Games\DCS\KNEEBOARD.</a:t>
+            </a:r>
+          </a:p>
+          <a:p>
             <a:r>
               <a:rPr lang="en-GB" sz="2500" dirty="0"/>
-              <a:t>.</a:t>
+              <a:t>The files are displayed in-game in alphabetical order.</a:t>
             </a:r>
           </a:p>
           <a:p>
@@ -10930,7 +10937,7 @@
           <a:p>
             <a:r>
               <a:rPr lang="en-GB" sz="3800" dirty="0"/>
-              <a:t>Testing the Setup</a:t>
+              <a:t>Configuring DCS Controls</a:t>
             </a:r>
           </a:p>
         </p:txBody>
@@ -10957,81 +10964,36 @@
           <a:lstStyle/>
           <a:p>
             <a:r>
-              <a:rPr lang="en-GB" sz="2000" dirty="0"/>
-              <a:t>Once all sections in this document have been completed, trainee pilots should attempt to connect to the 132</a:t>
-            </a:r>
-            <a:r>
-              <a:rPr lang="en-GB" sz="2000" baseline="30000" dirty="0"/>
-              <a:t>nd</a:t>
-            </a:r>
-            <a:r>
-              <a:rPr lang="en-GB" sz="2000" dirty="0"/>
-              <a:t> Virtual Wing server, using the details provided in the Multiplayer Instructions.</a:t>
-            </a:r>
-          </a:p>
-          <a:p>
-            <a:r>
-              <a:rPr lang="en-GB" sz="2000" dirty="0"/>
-              <a:t>Pilots may select a slot and spawn into an aircraft to test their ability to connect and attempt to verify their control mappings.</a:t>
-            </a:r>
-          </a:p>
-          <a:p>
-            <a:r>
-              <a:rPr lang="en-GB" sz="2000" dirty="0">
-                <a:solidFill>
-                  <a:srgbClr val="FF0000"/>
-                </a:solidFill>
+              <a:rPr lang="en-GB" sz="2500" dirty="0"/>
+              <a:t>In preparation to fly, trainee pilots should map controls for their joystick/HOTAS.</a:t>
+            </a:r>
+          </a:p>
+          <a:p>
+            <a:r>
+              <a:rPr lang="en-GB" sz="2500" dirty="0"/>
+              <a:t>The 494</a:t>
+            </a:r>
+            <a:r>
+              <a:rPr lang="en-GB" sz="2500" baseline="30000" dirty="0"/>
+              <a:t>th</a:t>
+            </a:r>
+            <a:r>
+              <a:rPr lang="en-GB" sz="2500" dirty="0"/>
+              <a:t> VFS recommends the use of Chuck’s Guides for support in mapping. The F/A-18C guide is available </a:t>
+            </a:r>
+            <a:r>
+              <a:rPr lang="en-GB" sz="2500" dirty="0">
+                <a:hlinkClick r:id="rId2"/>
               </a:rPr>
-              <a:t>Trainee pilots </a:t>
-            </a:r>
-            <a:r>
-              <a:rPr lang="en-GB" sz="2000" b="1" dirty="0">
-                <a:solidFill>
-                  <a:srgbClr val="FF0000"/>
-                </a:solidFill>
-              </a:rPr>
-              <a:t>MUST NOT </a:t>
-            </a:r>
-            <a:r>
-              <a:rPr lang="en-GB" sz="2000" dirty="0">
-                <a:solidFill>
-                  <a:srgbClr val="FF0000"/>
-                </a:solidFill>
-              </a:rPr>
-              <a:t>attempt to start their aircraft, taxi or </a:t>
-            </a:r>
-            <a:r>
-              <a:rPr lang="en-GB" sz="2000" dirty="0" err="1">
-                <a:solidFill>
-                  <a:srgbClr val="FF0000"/>
-                </a:solidFill>
-              </a:rPr>
-              <a:t>takeoff</a:t>
-            </a:r>
-            <a:r>
-              <a:rPr lang="en-GB" sz="2000" dirty="0">
-                <a:solidFill>
-                  <a:srgbClr val="FF0000"/>
-                </a:solidFill>
-              </a:rPr>
-              <a:t> without an instructor pilot whilst connected to the 132</a:t>
-            </a:r>
-            <a:r>
-              <a:rPr lang="en-GB" sz="2000" baseline="30000" dirty="0">
-                <a:solidFill>
-                  <a:srgbClr val="FF0000"/>
-                </a:solidFill>
-              </a:rPr>
-              <a:t>nd</a:t>
-            </a:r>
-            <a:r>
-              <a:rPr lang="en-GB" sz="2000" dirty="0">
-                <a:solidFill>
-                  <a:srgbClr val="FF0000"/>
-                </a:solidFill>
-              </a:rPr>
-              <a:t> Server.</a:t>
-            </a:r>
+              <a:t>here</a:t>
+            </a:r>
+            <a:r>
+              <a:rPr lang="en-GB" sz="2500" dirty="0"/>
+              <a:t>.</a:t>
+            </a:r>
+          </a:p>
+          <a:p>
+            <a:endParaRPr lang="en-GB" sz="2500" dirty="0"/>
           </a:p>
         </p:txBody>
       </p:sp>
@@ -11073,7 +11035,7 @@
     </p:spTree>
     <p:extLst>
       <p:ext uri="{BB962C8B-B14F-4D97-AF65-F5344CB8AC3E}">
-        <p14:creationId xmlns:p14="http://schemas.microsoft.com/office/powerpoint/2010/main" val="493347825"/>
+        <p14:creationId xmlns:p14="http://schemas.microsoft.com/office/powerpoint/2010/main" val="3729102954"/>
       </p:ext>
     </p:extLst>
   </p:cSld>
@@ -11105,7 +11067,7 @@
           <p:cNvPr id="2" name="Title 1">
             <a:extLst>
               <a:ext uri="{FF2B5EF4-FFF2-40B4-BE49-F238E27FC236}">
-                <a16:creationId xmlns:a16="http://schemas.microsoft.com/office/drawing/2014/main" id="{258D4D44-22E7-4109-A6EE-A4807EA00991}"/>
+                <a16:creationId xmlns:a16="http://schemas.microsoft.com/office/drawing/2014/main" id="{C0F25102-B5F4-4BCF-AC6E-E385A104172E}"/>
               </a:ext>
             </a:extLst>
           </p:cNvPr>
@@ -11116,142 +11078,162 @@
             <p:ph type="title"/>
           </p:nvPr>
         </p:nvSpPr>
+        <p:spPr>
+          <a:xfrm>
+            <a:off x="103312" y="828731"/>
+            <a:ext cx="8789168" cy="967380"/>
+          </a:xfrm>
+        </p:spPr>
+        <p:txBody>
+          <a:bodyPr/>
+          <a:lstStyle/>
+          <a:p>
+            <a:r>
+              <a:rPr lang="en-GB" sz="3800" dirty="0"/>
+              <a:t>Testing the Setup</a:t>
+            </a:r>
+          </a:p>
+        </p:txBody>
+      </p:sp>
+      <p:sp>
+        <p:nvSpPr>
+          <p:cNvPr id="3" name="Content Placeholder 2">
+            <a:extLst>
+              <a:ext uri="{FF2B5EF4-FFF2-40B4-BE49-F238E27FC236}">
+                <a16:creationId xmlns:a16="http://schemas.microsoft.com/office/drawing/2014/main" id="{552AC59D-0089-491B-972F-1BE19B339C77}"/>
+              </a:ext>
+            </a:extLst>
+          </p:cNvPr>
+          <p:cNvSpPr>
+            <a:spLocks noGrp="1"/>
+          </p:cNvSpPr>
+          <p:nvPr>
+            <p:ph sz="half" idx="1"/>
+          </p:nvPr>
+        </p:nvSpPr>
         <p:spPr/>
         <p:txBody>
           <a:bodyPr/>
           <a:lstStyle/>
           <a:p>
-            <a:endParaRPr lang="en-GB"/>
-          </a:p>
-        </p:txBody>
-      </p:sp>
-      <p:sp>
-        <p:nvSpPr>
-          <p:cNvPr id="3" name="Content Placeholder 2">
-            <a:extLst>
-              <a:ext uri="{FF2B5EF4-FFF2-40B4-BE49-F238E27FC236}">
-                <a16:creationId xmlns:a16="http://schemas.microsoft.com/office/drawing/2014/main" id="{EC417A36-FFD9-46AB-AF64-F373D60FEA0F}"/>
-              </a:ext>
-            </a:extLst>
-          </p:cNvPr>
-          <p:cNvSpPr>
-            <a:spLocks noGrp="1"/>
-          </p:cNvSpPr>
-          <p:nvPr>
-            <p:ph sz="half" idx="1"/>
-          </p:nvPr>
-        </p:nvSpPr>
-        <p:spPr/>
-        <p:txBody>
-          <a:bodyPr/>
+            <a:r>
+              <a:rPr lang="en-GB" sz="2000" dirty="0"/>
+              <a:t>Once all sections in this document have been completed, trainee pilots should attempt to connect to the 132</a:t>
+            </a:r>
+            <a:r>
+              <a:rPr lang="en-GB" sz="2000" baseline="30000" dirty="0"/>
+              <a:t>nd</a:t>
+            </a:r>
+            <a:r>
+              <a:rPr lang="en-GB" sz="2000" dirty="0"/>
+              <a:t> Virtual Wing server, using the details provided in the Multiplayer Instructions.</a:t>
+            </a:r>
+          </a:p>
+          <a:p>
+            <a:r>
+              <a:rPr lang="en-GB" sz="2000" dirty="0"/>
+              <a:t>Pilots may select a slot and spawn into an aircraft to test their ability to connect and attempt to verify their control mappings.</a:t>
+            </a:r>
+          </a:p>
+          <a:p>
+            <a:r>
+              <a:rPr lang="en-GB" sz="2000" dirty="0">
+                <a:solidFill>
+                  <a:srgbClr val="FF0000"/>
+                </a:solidFill>
+              </a:rPr>
+              <a:t>Trainee pilots </a:t>
+            </a:r>
+            <a:r>
+              <a:rPr lang="en-GB" sz="2000" b="1" dirty="0">
+                <a:solidFill>
+                  <a:srgbClr val="FF0000"/>
+                </a:solidFill>
+              </a:rPr>
+              <a:t>MUST NOT </a:t>
+            </a:r>
+            <a:r>
+              <a:rPr lang="en-GB" sz="2000" dirty="0">
+                <a:solidFill>
+                  <a:srgbClr val="FF0000"/>
+                </a:solidFill>
+              </a:rPr>
+              <a:t>attempt to start their aircraft, taxi or </a:t>
+            </a:r>
+            <a:r>
+              <a:rPr lang="en-GB" sz="2000" dirty="0" err="1">
+                <a:solidFill>
+                  <a:srgbClr val="FF0000"/>
+                </a:solidFill>
+              </a:rPr>
+              <a:t>takeoff</a:t>
+            </a:r>
+            <a:r>
+              <a:rPr lang="en-GB" sz="2000" dirty="0">
+                <a:solidFill>
+                  <a:srgbClr val="FF0000"/>
+                </a:solidFill>
+              </a:rPr>
+              <a:t> without an instructor pilot whilst connected to the 132</a:t>
+            </a:r>
+            <a:r>
+              <a:rPr lang="en-GB" sz="2000" baseline="30000" dirty="0">
+                <a:solidFill>
+                  <a:srgbClr val="FF0000"/>
+                </a:solidFill>
+              </a:rPr>
+              <a:t>nd</a:t>
+            </a:r>
+            <a:r>
+              <a:rPr lang="en-GB" sz="2000" dirty="0">
+                <a:solidFill>
+                  <a:srgbClr val="FF0000"/>
+                </a:solidFill>
+              </a:rPr>
+              <a:t> Server.</a:t>
+            </a:r>
+          </a:p>
+        </p:txBody>
+      </p:sp>
+      <p:sp>
+        <p:nvSpPr>
+          <p:cNvPr id="5" name="TextBox 4">
+            <a:extLst>
+              <a:ext uri="{FF2B5EF4-FFF2-40B4-BE49-F238E27FC236}">
+                <a16:creationId xmlns:a16="http://schemas.microsoft.com/office/drawing/2014/main" id="{2B0FF1A8-601A-4FB1-90C6-1676A1A80008}"/>
+              </a:ext>
+            </a:extLst>
+          </p:cNvPr>
+          <p:cNvSpPr txBox="1"/>
+          <p:nvPr/>
+        </p:nvSpPr>
+        <p:spPr>
+          <a:xfrm>
+            <a:off x="971600" y="6453336"/>
+            <a:ext cx="1440160" cy="276999"/>
+          </a:xfrm>
+          <a:prstGeom prst="rect">
+            <a:avLst/>
+          </a:prstGeom>
+          <a:noFill/>
+        </p:spPr>
+        <p:txBody>
+          <a:bodyPr wrap="square" rtlCol="0">
+            <a:spAutoFit/>
+          </a:bodyPr>
           <a:lstStyle/>
           <a:p>
             <a:r>
               <a:rPr lang="en-GB" sz="1200" dirty="0"/>
-              <a:t>*Ensure that*</a:t>
-            </a:r>
-            <a:br>
-              <a:rPr lang="en-GB" sz="1200" dirty="0"/>
-            </a:br>
-            <a:r>
-              <a:rPr lang="en-GB" sz="1200" dirty="0"/>
-              <a:t>- </a:t>
-            </a:r>
-            <a:r>
-              <a:rPr lang="en-GB" sz="1200" dirty="0" err="1"/>
-              <a:t>TrackIR</a:t>
-            </a:r>
-            <a:r>
-              <a:rPr lang="en-GB" sz="1200" dirty="0"/>
-              <a:t> or VR setup is working as intended</a:t>
-            </a:r>
-            <a:br>
-              <a:rPr lang="en-GB" sz="1200" dirty="0"/>
-            </a:br>
-            <a:r>
-              <a:rPr lang="en-GB" sz="1200" dirty="0"/>
-              <a:t>- Key bindings are set for both DCS, SRS and </a:t>
-            </a:r>
-            <a:r>
-              <a:rPr lang="en-GB" sz="1200" dirty="0" err="1"/>
-              <a:t>Teamspeak</a:t>
-            </a:r>
-            <a:r>
-              <a:rPr lang="en-GB" sz="1200" dirty="0"/>
-              <a:t>. Push-to-talk is *mandatory*</a:t>
-            </a:r>
-          </a:p>
-          <a:p>
-            <a:r>
-              <a:rPr lang="en-GB" sz="1200" dirty="0"/>
-              <a:t>*Test the setup*</a:t>
-            </a:r>
-            <a:br>
-              <a:rPr lang="en-GB" sz="1200" dirty="0"/>
-            </a:br>
-            <a:r>
-              <a:rPr lang="en-GB" sz="1200" dirty="0"/>
-              <a:t>When installed, enter 132nd Virtual Wing dedicated server;</a:t>
-            </a:r>
-            <a:br>
-              <a:rPr lang="en-GB" sz="1200" dirty="0"/>
-            </a:br>
-            <a:r>
-              <a:rPr lang="en-GB" sz="1200" dirty="0"/>
-              <a:t>If you can connect, your mods are setup correctly. Proceed to confirm the below;</a:t>
-            </a:r>
-            <a:br>
-              <a:rPr lang="en-GB" sz="1200" dirty="0"/>
-            </a:br>
-            <a:r>
-              <a:rPr lang="en-GB" sz="1200" dirty="0"/>
-              <a:t>To confirm that skins are correctly installed.</a:t>
-            </a:r>
-            <a:br>
-              <a:rPr lang="en-GB" sz="1200" dirty="0"/>
-            </a:br>
-            <a:r>
-              <a:rPr lang="en-GB" sz="1200" dirty="0"/>
-              <a:t>To confirm that textures at the ranges are correctly installed. </a:t>
-            </a:r>
-          </a:p>
-          <a:p>
-            <a:endParaRPr lang="en-GB" sz="1200" dirty="0"/>
-          </a:p>
-          <a:p>
-            <a:r>
-              <a:rPr lang="en-GB" sz="1200" dirty="0"/>
-              <a:t>*Tutorial references:*</a:t>
-            </a:r>
-          </a:p>
-          <a:p>
-            <a:r>
-              <a:rPr lang="en-GB" sz="1200" dirty="0" err="1"/>
-              <a:t>RedKite's</a:t>
-            </a:r>
-            <a:r>
-              <a:rPr lang="en-GB" sz="1200" dirty="0"/>
-              <a:t> DCS F/A-18C Hornet Controls and Cockpit Tutorial Quick start</a:t>
-            </a:r>
-          </a:p>
-          <a:p>
-            <a:r>
-              <a:rPr lang="en-GB" sz="1200" dirty="0"/>
-              <a:t>Link: https://www.youtube.com/watch?v=iKLrnJpc8I4&amp;list=PLml_c09ciuctIreNtpLoPg1DByY5upg6v</a:t>
-            </a:r>
-          </a:p>
-          <a:p>
-            <a:endParaRPr lang="en-GB" sz="1200" dirty="0"/>
-          </a:p>
-          <a:p>
-            <a:endParaRPr lang="en-GB" sz="1200" dirty="0"/>
+              <a:t>494(P)-BAS-01</a:t>
+            </a:r>
           </a:p>
         </p:txBody>
       </p:sp>
     </p:spTree>
     <p:extLst>
       <p:ext uri="{BB962C8B-B14F-4D97-AF65-F5344CB8AC3E}">
-        <p14:creationId xmlns:p14="http://schemas.microsoft.com/office/powerpoint/2010/main" val="266764874"/>
+        <p14:creationId xmlns:p14="http://schemas.microsoft.com/office/powerpoint/2010/main" val="493347825"/>
       </p:ext>
     </p:extLst>
   </p:cSld>
@@ -11333,50 +11315,53 @@
           <a:lstStyle/>
           <a:p>
             <a:r>
-              <a:rPr lang="en-GB" sz="2600" dirty="0"/>
+              <a:rPr lang="en-GB" sz="2500" dirty="0"/>
               <a:t>Downloading and configuring </a:t>
             </a:r>
             <a:r>
-              <a:rPr lang="en-GB" sz="2600" dirty="0" err="1"/>
+              <a:rPr lang="en-GB" sz="2500" dirty="0" err="1"/>
               <a:t>Teamspeak</a:t>
             </a:r>
             <a:r>
-              <a:rPr lang="en-GB" sz="2600" dirty="0"/>
+              <a:rPr lang="en-GB" sz="2500" dirty="0"/>
               <a:t> 3</a:t>
             </a:r>
           </a:p>
           <a:p>
             <a:r>
-              <a:rPr lang="en-GB" sz="2600" dirty="0"/>
+              <a:rPr lang="en-GB" sz="2500" dirty="0"/>
               <a:t>Downloading and configuring DCS SRS</a:t>
             </a:r>
           </a:p>
           <a:p>
             <a:r>
-              <a:rPr lang="en-GB" sz="2600" dirty="0"/>
+              <a:rPr lang="en-GB" sz="2500" dirty="0"/>
               <a:t>Downloading and configuring OVGME</a:t>
             </a:r>
           </a:p>
           <a:p>
             <a:r>
-              <a:rPr lang="en-GB" sz="2600" dirty="0"/>
+              <a:rPr lang="en-GB" sz="2500" dirty="0"/>
               <a:t>Optionally setup Track IR/VR</a:t>
             </a:r>
           </a:p>
           <a:p>
             <a:r>
-              <a:rPr lang="en-GB" sz="2600" dirty="0"/>
+              <a:rPr lang="en-GB" sz="2500" dirty="0"/>
+              <a:t>Importing Kneeboards</a:t>
+            </a:r>
+          </a:p>
+          <a:p>
+            <a:r>
+              <a:rPr lang="en-GB" sz="2500" dirty="0"/>
               <a:t>Setting up DCS Controls</a:t>
             </a:r>
           </a:p>
           <a:p>
             <a:r>
-              <a:rPr lang="en-GB" sz="2600" dirty="0"/>
+              <a:rPr lang="en-GB" sz="2500" dirty="0"/>
               <a:t>Testing the Setup</a:t>
             </a:r>
-          </a:p>
-          <a:p>
-            <a:endParaRPr lang="en-GB" sz="2600" dirty="0"/>
           </a:p>
         </p:txBody>
       </p:sp>

</xml_diff>